<commit_message>
Adding final Exam, 2nd mini-project, and Derivatives and Integration
</commit_message>
<xml_diff>
--- a/07_Gradient_Descent/07_Gradient_Descent.pptx
+++ b/07_Gradient_Descent/07_Gradient_Descent.pptx
@@ -1337,7 +1337,7 @@
           <a:p>
             <a:fld id="{942A4958-D8BA-674A-AD6B-A5BB0F29A231}" type="datetimeFigureOut">
               <a:rPr lang="en-US" smtClean="0"/>
-              <a:t>10/29/18</a:t>
+              <a:t>11/6/18</a:t>
             </a:fld>
             <a:endParaRPr lang="en-US"/>
           </a:p>
@@ -1575,7 +1575,7 @@
           <a:p>
             <a:fld id="{942A4958-D8BA-674A-AD6B-A5BB0F29A231}" type="datetimeFigureOut">
               <a:rPr lang="en-US" smtClean="0"/>
-              <a:t>10/29/18</a:t>
+              <a:t>11/6/18</a:t>
             </a:fld>
             <a:endParaRPr lang="en-US"/>
           </a:p>
@@ -1755,7 +1755,7 @@
           <a:p>
             <a:fld id="{942A4958-D8BA-674A-AD6B-A5BB0F29A231}" type="datetimeFigureOut">
               <a:rPr lang="en-US" smtClean="0"/>
-              <a:t>10/29/18</a:t>
+              <a:t>11/6/18</a:t>
             </a:fld>
             <a:endParaRPr lang="en-US"/>
           </a:p>
@@ -1925,7 +1925,7 @@
           <a:p>
             <a:fld id="{942A4958-D8BA-674A-AD6B-A5BB0F29A231}" type="datetimeFigureOut">
               <a:rPr lang="en-US" smtClean="0"/>
-              <a:t>10/29/18</a:t>
+              <a:t>11/6/18</a:t>
             </a:fld>
             <a:endParaRPr lang="en-US"/>
           </a:p>
@@ -2201,7 +2201,7 @@
           <a:p>
             <a:fld id="{942A4958-D8BA-674A-AD6B-A5BB0F29A231}" type="datetimeFigureOut">
               <a:rPr lang="en-US" smtClean="0"/>
-              <a:t>10/29/18</a:t>
+              <a:t>11/6/18</a:t>
             </a:fld>
             <a:endParaRPr lang="en-US"/>
           </a:p>
@@ -3402,7 +3402,7 @@
           <a:p>
             <a:fld id="{942A4958-D8BA-674A-AD6B-A5BB0F29A231}" type="datetimeFigureOut">
               <a:rPr lang="en-US" smtClean="0"/>
-              <a:t>10/29/18</a:t>
+              <a:t>11/6/18</a:t>
             </a:fld>
             <a:endParaRPr lang="en-US"/>
           </a:p>
@@ -3792,7 +3792,7 @@
           <a:p>
             <a:fld id="{942A4958-D8BA-674A-AD6B-A5BB0F29A231}" type="datetimeFigureOut">
               <a:rPr lang="en-US" smtClean="0"/>
-              <a:t>10/29/18</a:t>
+              <a:t>11/6/18</a:t>
             </a:fld>
             <a:endParaRPr lang="en-US"/>
           </a:p>
@@ -3915,7 +3915,7 @@
           <a:p>
             <a:fld id="{942A4958-D8BA-674A-AD6B-A5BB0F29A231}" type="datetimeFigureOut">
               <a:rPr lang="en-US" smtClean="0"/>
-              <a:t>10/29/18</a:t>
+              <a:t>11/6/18</a:t>
             </a:fld>
             <a:endParaRPr lang="en-US"/>
           </a:p>
@@ -4010,7 +4010,7 @@
           <a:p>
             <a:fld id="{942A4958-D8BA-674A-AD6B-A5BB0F29A231}" type="datetimeFigureOut">
               <a:rPr lang="en-US" smtClean="0"/>
-              <a:t>10/29/18</a:t>
+              <a:t>11/6/18</a:t>
             </a:fld>
             <a:endParaRPr lang="en-US"/>
           </a:p>
@@ -4773,7 +4773,7 @@
           <a:p>
             <a:fld id="{942A4958-D8BA-674A-AD6B-A5BB0F29A231}" type="datetimeFigureOut">
               <a:rPr lang="en-US" smtClean="0"/>
-              <a:t>10/29/18</a:t>
+              <a:t>11/6/18</a:t>
             </a:fld>
             <a:endParaRPr lang="en-US"/>
           </a:p>
@@ -5613,7 +5613,7 @@
           <a:p>
             <a:fld id="{942A4958-D8BA-674A-AD6B-A5BB0F29A231}" type="datetimeFigureOut">
               <a:rPr lang="en-US" smtClean="0"/>
-              <a:t>10/29/18</a:t>
+              <a:t>11/6/18</a:t>
             </a:fld>
             <a:endParaRPr lang="en-US"/>
           </a:p>
@@ -5840,7 +5840,7 @@
           <a:p>
             <a:fld id="{942A4958-D8BA-674A-AD6B-A5BB0F29A231}" type="datetimeFigureOut">
               <a:rPr lang="en-US" smtClean="0"/>
-              <a:t>10/29/18</a:t>
+              <a:t>11/6/18</a:t>
             </a:fld>
             <a:endParaRPr lang="en-US"/>
           </a:p>
@@ -7651,8 +7651,12 @@
               <a:buAutoNum type="arabicPeriod"/>
             </a:pPr>
             <a:r>
+              <a:rPr lang="en-US"/>
+              <a:t>Pick starting </a:t>
+            </a:r>
+            <a:r>
               <a:rPr lang="en-US" dirty="0"/>
-              <a:t>Pick random starting m and b values</a:t>
+              <a:t>m and b values</a:t>
             </a:r>
           </a:p>
           <a:p>
@@ -9485,7 +9489,7 @@
         </p:spPr>
         <p:txBody>
           <a:bodyPr>
-            <a:normAutofit fontScale="92500" lnSpcReduction="10000"/>
+            <a:normAutofit fontScale="92500" lnSpcReduction="20000"/>
           </a:bodyPr>
           <a:lstStyle/>
           <a:p>
@@ -9501,7 +9505,14 @@
             </a:pPr>
             <a:r>
               <a:rPr lang="en-US" dirty="0"/>
-              <a:t>Pick random values for m (slope) and b (y-intercept)</a:t>
+              <a:t>Pick values for m (slope) and b (y-intercept)</a:t>
+            </a:r>
+          </a:p>
+          <a:p>
+            <a:pPr lvl="1"/>
+            <a:r>
+              <a:rPr lang="en-US" dirty="0"/>
+              <a:t>Randomly?  Not if we can help it!</a:t>
             </a:r>
           </a:p>
           <a:p>

</xml_diff>